<commit_message>
made further chagnes to presentation
</commit_message>
<xml_diff>
--- a/GroupCinemaProject.pptx
+++ b/GroupCinemaProject.pptx
@@ -9,10 +9,11 @@
     <p:sldId id="257" r:id="rId3"/>
     <p:sldId id="258" r:id="rId4"/>
     <p:sldId id="264" r:id="rId5"/>
-    <p:sldId id="265" r:id="rId6"/>
-    <p:sldId id="270" r:id="rId7"/>
-    <p:sldId id="267" r:id="rId8"/>
-    <p:sldId id="268" r:id="rId9"/>
+    <p:sldId id="271" r:id="rId6"/>
+    <p:sldId id="265" r:id="rId7"/>
+    <p:sldId id="270" r:id="rId8"/>
+    <p:sldId id="267" r:id="rId9"/>
+    <p:sldId id="268" r:id="rId10"/>
   </p:sldIdLst>
   <p:sldSz cx="12192000" cy="6858000"/>
   <p:notesSz cx="6858000" cy="9144000"/>
@@ -123,7 +124,7 @@
 <p1510:revInfo xmlns:a="http://schemas.openxmlformats.org/drawingml/2006/main" xmlns:r="http://schemas.openxmlformats.org/officeDocument/2006/relationships" xmlns:p1510="http://schemas.microsoft.com/office/powerpoint/2015/10/main">
   <p1510:revLst>
     <p1510:client id="{3EDA844C-9A51-4B6B-9BE3-BC5CC54C0E35}" v="1" dt="2020-09-08T08:52:41.657"/>
-    <p1510:client id="{8820B2EB-8337-420E-B79D-0E7AFCB31723}" v="4" dt="2020-09-08T09:37:24.662"/>
+    <p1510:client id="{8820B2EB-8337-420E-B79D-0E7AFCB31723}" v="5" dt="2020-09-08T19:39:22.340"/>
   </p1510:revLst>
 </p1510:revInfo>
 </file>
@@ -602,8 +603,8 @@
   </pc:docChgLst>
   <pc:docChgLst>
     <pc:chgData name="Nilay Sanghrajka" userId="247b90a400b52899" providerId="LiveId" clId="{8820B2EB-8337-420E-B79D-0E7AFCB31723}"/>
-    <pc:docChg chg="undo redo custSel mod delSld modSld sldOrd">
-      <pc:chgData name="Nilay Sanghrajka" userId="247b90a400b52899" providerId="LiveId" clId="{8820B2EB-8337-420E-B79D-0E7AFCB31723}" dt="2020-09-08T11:04:01.914" v="405" actId="122"/>
+    <pc:docChg chg="undo redo custSel mod addSld delSld modSld sldOrd">
+      <pc:chgData name="Nilay Sanghrajka" userId="247b90a400b52899" providerId="LiveId" clId="{8820B2EB-8337-420E-B79D-0E7AFCB31723}" dt="2020-09-08T19:39:46.968" v="428" actId="14100"/>
       <pc:docMkLst>
         <pc:docMk/>
       </pc:docMkLst>
@@ -725,6 +726,45 @@
             <pc:docMk/>
             <pc:sldMk cId="28597378" sldId="267"/>
             <ac:picMk id="5" creationId="{AE680929-9CAE-43FD-A3F0-0C38223825E3}"/>
+          </ac:picMkLst>
+        </pc:picChg>
+      </pc:sldChg>
+      <pc:sldChg chg="addSp delSp modSp add mod">
+        <pc:chgData name="Nilay Sanghrajka" userId="247b90a400b52899" providerId="LiveId" clId="{8820B2EB-8337-420E-B79D-0E7AFCB31723}" dt="2020-09-08T19:39:46.968" v="428" actId="14100"/>
+        <pc:sldMkLst>
+          <pc:docMk/>
+          <pc:sldMk cId="121747750" sldId="271"/>
+        </pc:sldMkLst>
+        <pc:spChg chg="mod">
+          <ac:chgData name="Nilay Sanghrajka" userId="247b90a400b52899" providerId="LiveId" clId="{8820B2EB-8337-420E-B79D-0E7AFCB31723}" dt="2020-09-08T19:39:01.578" v="420" actId="20577"/>
+          <ac:spMkLst>
+            <pc:docMk/>
+            <pc:sldMk cId="121747750" sldId="271"/>
+            <ac:spMk id="2" creationId="{DF91F68C-DB8F-4C8C-A358-301FE86C5C69}"/>
+          </ac:spMkLst>
+        </pc:spChg>
+        <pc:spChg chg="mod">
+          <ac:chgData name="Nilay Sanghrajka" userId="247b90a400b52899" providerId="LiveId" clId="{8820B2EB-8337-420E-B79D-0E7AFCB31723}" dt="2020-09-08T19:39:40.826" v="426" actId="1076"/>
+          <ac:spMkLst>
+            <pc:docMk/>
+            <pc:sldMk cId="121747750" sldId="271"/>
+            <ac:spMk id="7" creationId="{C02301FE-18FF-4457-B142-AD5FF6407A48}"/>
+          </ac:spMkLst>
+        </pc:spChg>
+        <pc:picChg chg="del">
+          <ac:chgData name="Nilay Sanghrajka" userId="247b90a400b52899" providerId="LiveId" clId="{8820B2EB-8337-420E-B79D-0E7AFCB31723}" dt="2020-09-08T19:39:24.902" v="422" actId="478"/>
+          <ac:picMkLst>
+            <pc:docMk/>
+            <pc:sldMk cId="121747750" sldId="271"/>
+            <ac:picMk id="3" creationId="{153220D1-CF2A-4E71-BDBC-B6C40AD8F50F}"/>
+          </ac:picMkLst>
+        </pc:picChg>
+        <pc:picChg chg="add mod">
+          <ac:chgData name="Nilay Sanghrajka" userId="247b90a400b52899" providerId="LiveId" clId="{8820B2EB-8337-420E-B79D-0E7AFCB31723}" dt="2020-09-08T19:39:46.968" v="428" actId="14100"/>
+          <ac:picMkLst>
+            <pc:docMk/>
+            <pc:sldMk cId="121747750" sldId="271"/>
+            <ac:picMk id="4" creationId="{A95E7A09-77D6-46E3-BBB9-27E327EDA110}"/>
           </ac:picMkLst>
         </pc:picChg>
       </pc:sldChg>
@@ -4636,6 +4676,142 @@
             <a:pPr algn="ctr"/>
             <a:r>
               <a:rPr lang="en-GB" b="1" dirty="0"/>
+              <a:t>Data flow Diagram</a:t>
+            </a:r>
+          </a:p>
+        </p:txBody>
+      </p:sp>
+      <p:sp>
+        <p:nvSpPr>
+          <p:cNvPr id="7" name="Content Placeholder 6">
+            <a:extLst>
+              <a:ext uri="{FF2B5EF4-FFF2-40B4-BE49-F238E27FC236}">
+                <a16:creationId xmlns:a16="http://schemas.microsoft.com/office/drawing/2014/main" id="{C02301FE-18FF-4457-B142-AD5FF6407A48}"/>
+              </a:ext>
+            </a:extLst>
+          </p:cNvPr>
+          <p:cNvSpPr>
+            <a:spLocks noGrp="1"/>
+          </p:cNvSpPr>
+          <p:nvPr>
+            <p:ph idx="1"/>
+          </p:nvPr>
+        </p:nvSpPr>
+        <p:spPr>
+          <a:xfrm>
+            <a:off x="316512" y="2221338"/>
+            <a:ext cx="2846566" cy="4206240"/>
+          </a:xfrm>
+        </p:spPr>
+        <p:txBody>
+          <a:bodyPr>
+            <a:normAutofit/>
+          </a:bodyPr>
+          <a:lstStyle/>
+          <a:p>
+            <a:endParaRPr lang="en-US" sz="2000" dirty="0"/>
+          </a:p>
+        </p:txBody>
+      </p:sp>
+      <p:pic>
+        <p:nvPicPr>
+          <p:cNvPr id="4" name="Picture 3">
+            <a:extLst>
+              <a:ext uri="{FF2B5EF4-FFF2-40B4-BE49-F238E27FC236}">
+                <a16:creationId xmlns:a16="http://schemas.microsoft.com/office/drawing/2014/main" id="{A95E7A09-77D6-46E3-BBB9-27E327EDA110}"/>
+              </a:ext>
+            </a:extLst>
+          </p:cNvPr>
+          <p:cNvPicPr>
+            <a:picLocks noChangeAspect="1"/>
+          </p:cNvPicPr>
+          <p:nvPr/>
+        </p:nvPicPr>
+        <p:blipFill>
+          <a:blip r:embed="rId2"/>
+          <a:stretch>
+            <a:fillRect/>
+          </a:stretch>
+        </p:blipFill>
+        <p:spPr>
+          <a:xfrm>
+            <a:off x="3918857" y="2221339"/>
+            <a:ext cx="7842768" cy="4205648"/>
+          </a:xfrm>
+          <a:prstGeom prst="rect">
+            <a:avLst/>
+          </a:prstGeom>
+        </p:spPr>
+      </p:pic>
+    </p:spTree>
+    <p:extLst>
+      <p:ext uri="{BB962C8B-B14F-4D97-AF65-F5344CB8AC3E}">
+        <p14:creationId xmlns:p14="http://schemas.microsoft.com/office/powerpoint/2010/main" val="121747750"/>
+      </p:ext>
+    </p:extLst>
+  </p:cSld>
+  <p:clrMapOvr>
+    <a:masterClrMapping/>
+  </p:clrMapOvr>
+</p:sld>
+</file>
+
+<file path=ppt/slides/slide6.xml><?xml version="1.0" encoding="utf-8"?>
+<p:sld xmlns:a="http://schemas.openxmlformats.org/drawingml/2006/main" xmlns:r="http://schemas.openxmlformats.org/officeDocument/2006/relationships" xmlns:p="http://schemas.openxmlformats.org/presentationml/2006/main">
+  <p:cSld>
+    <p:bg>
+      <p:bgPr>
+        <a:solidFill>
+          <a:schemeClr val="bg2"/>
+        </a:solidFill>
+        <a:effectLst/>
+      </p:bgPr>
+    </p:bg>
+    <p:spTree>
+      <p:nvGrpSpPr>
+        <p:cNvPr id="1" name=""/>
+        <p:cNvGrpSpPr/>
+        <p:nvPr/>
+      </p:nvGrpSpPr>
+      <p:grpSpPr>
+        <a:xfrm>
+          <a:off x="0" y="0"/>
+          <a:ext cx="0" cy="0"/>
+          <a:chOff x="0" y="0"/>
+          <a:chExt cx="0" cy="0"/>
+        </a:xfrm>
+      </p:grpSpPr>
+      <p:sp>
+        <p:nvSpPr>
+          <p:cNvPr id="2" name="Title 1">
+            <a:extLst>
+              <a:ext uri="{FF2B5EF4-FFF2-40B4-BE49-F238E27FC236}">
+                <a16:creationId xmlns:a16="http://schemas.microsoft.com/office/drawing/2014/main" id="{DF91F68C-DB8F-4C8C-A358-301FE86C5C69}"/>
+              </a:ext>
+            </a:extLst>
+          </p:cNvPr>
+          <p:cNvSpPr>
+            <a:spLocks noGrp="1"/>
+          </p:cNvSpPr>
+          <p:nvPr>
+            <p:ph type="title"/>
+          </p:nvPr>
+        </p:nvSpPr>
+        <p:spPr>
+          <a:xfrm>
+            <a:off x="1202919" y="284176"/>
+            <a:ext cx="9784080" cy="1508760"/>
+          </a:xfrm>
+        </p:spPr>
+        <p:txBody>
+          <a:bodyPr>
+            <a:normAutofit/>
+          </a:bodyPr>
+          <a:lstStyle/>
+          <a:p>
+            <a:pPr algn="ctr"/>
+            <a:r>
+              <a:rPr lang="en-GB" b="1" dirty="0"/>
               <a:t>Jira Board</a:t>
             </a:r>
           </a:p>
@@ -4716,7 +4892,7 @@
 </p:sld>
 </file>
 
-<file path=ppt/slides/slide6.xml><?xml version="1.0" encoding="utf-8"?>
+<file path=ppt/slides/slide7.xml><?xml version="1.0" encoding="utf-8"?>
 <p:sld xmlns:a="http://schemas.openxmlformats.org/drawingml/2006/main" xmlns:r="http://schemas.openxmlformats.org/officeDocument/2006/relationships" xmlns:p="http://schemas.openxmlformats.org/presentationml/2006/main">
   <p:cSld>
     <p:spTree>
@@ -4807,7 +4983,7 @@
 </p:sld>
 </file>
 
-<file path=ppt/slides/slide7.xml><?xml version="1.0" encoding="utf-8"?>
+<file path=ppt/slides/slide8.xml><?xml version="1.0" encoding="utf-8"?>
 <p:sld xmlns:a="http://schemas.openxmlformats.org/drawingml/2006/main" xmlns:r="http://schemas.openxmlformats.org/officeDocument/2006/relationships" xmlns:p="http://schemas.openxmlformats.org/presentationml/2006/main">
   <p:cSld>
     <p:spTree>
@@ -4953,7 +5129,7 @@
 </p:sld>
 </file>
 
-<file path=ppt/slides/slide8.xml><?xml version="1.0" encoding="utf-8"?>
+<file path=ppt/slides/slide9.xml><?xml version="1.0" encoding="utf-8"?>
 <p:sld xmlns:a="http://schemas.openxmlformats.org/drawingml/2006/main" xmlns:r="http://schemas.openxmlformats.org/officeDocument/2006/relationships" xmlns:p="http://schemas.openxmlformats.org/presentationml/2006/main">
   <p:cSld>
     <p:spTree>

</xml_diff>